<commit_message>
Adapt installer URL in slides
</commit_message>
<xml_diff>
--- a/vorlesung/0 Organisatorisches.pptx
+++ b/vorlesung/0 Organisatorisches.pptx
@@ -313,7 +313,6 @@
           </a:p>
         </c:rich>
       </c:tx>
-      <c:layout/>
       <c:overlay val="0"/>
       <c:spPr>
         <a:noFill/>
@@ -432,11 +431,11 @@
         </c:dLbls>
         <c:gapWidth val="219"/>
         <c:overlap val="-27"/>
-        <c:axId val="-1662764912"/>
-        <c:axId val="-1662756752"/>
+        <c:axId val="1808805760"/>
+        <c:axId val="1808818816"/>
       </c:barChart>
       <c:catAx>
-        <c:axId val="-1662764912"/>
+        <c:axId val="1808805760"/>
         <c:scaling>
           <c:orientation val="minMax"/>
         </c:scaling>
@@ -479,7 +478,7 @@
             <a:endParaRPr lang="en-US"/>
           </a:p>
         </c:txPr>
-        <c:crossAx val="-1662756752"/>
+        <c:crossAx val="1808818816"/>
         <c:crosses val="autoZero"/>
         <c:auto val="1"/>
         <c:lblAlgn val="ctr"/>
@@ -487,7 +486,7 @@
         <c:noMultiLvlLbl val="0"/>
       </c:catAx>
       <c:valAx>
-        <c:axId val="-1662756752"/>
+        <c:axId val="1808818816"/>
         <c:scaling>
           <c:orientation val="minMax"/>
         </c:scaling>
@@ -511,7 +510,7 @@
         <c:majorTickMark val="out"/>
         <c:minorTickMark val="none"/>
         <c:tickLblPos val="nextTo"/>
-        <c:crossAx val="-1662764912"/>
+        <c:crossAx val="1808805760"/>
         <c:crosses val="autoZero"/>
         <c:crossBetween val="between"/>
       </c:valAx>
@@ -11630,7 +11629,7 @@
           <a:graphicData uri="http://schemas.openxmlformats.org/presentationml/2006/ole">
             <mc:AlternateContent xmlns:mc="http://schemas.openxmlformats.org/markup-compatibility/2006">
               <mc:Choice xmlns:v="urn:schemas-microsoft-com:vml" Requires="v">
-                <p:oleObj spid="_x0000_s27784" r:id="rId3" imgW="1038370" imgH="980952" progId="PBrush">
+                <p:oleObj spid="_x0000_s27786" r:id="rId3" imgW="1038370" imgH="980952" progId="PBrush">
                   <p:embed/>
                 </p:oleObj>
               </mc:Choice>
@@ -14624,7 +14623,7 @@
           <a:graphicData uri="http://schemas.openxmlformats.org/presentationml/2006/ole">
             <mc:AlternateContent xmlns:mc="http://schemas.openxmlformats.org/markup-compatibility/2006">
               <mc:Choice xmlns:v="urn:schemas-microsoft-com:vml" Requires="v">
-                <p:oleObj spid="_x0000_s1171" r:id="rId16" imgW="1038370" imgH="980952" progId="">
+                <p:oleObj spid="_x0000_s1173" r:id="rId16" imgW="1038370" imgH="980952" progId="">
                   <p:embed/>
                 </p:oleObj>
               </mc:Choice>
@@ -15062,7 +15061,7 @@
                 </a:lnSpc>
                 <a:defRPr/>
               </a:pPr>
-              <a:t>23.09.2014</a:t>
+              <a:t>02.10.2014</a:t>
             </a:fld>
             <a:r>
               <a:rPr lang="en-GB" altLang="de-DE" sz="1000" smtClean="0">
@@ -16570,7 +16569,7 @@
           <a:graphicData uri="http://schemas.openxmlformats.org/presentationml/2006/ole">
             <mc:AlternateContent xmlns:mc="http://schemas.openxmlformats.org/markup-compatibility/2006">
               <mc:Choice xmlns:v="urn:schemas-microsoft-com:vml" Requires="v">
-                <p:oleObj spid="_x0000_s2194" r:id="rId6" imgW="1038370" imgH="980952" progId="PBrush">
+                <p:oleObj spid="_x0000_s2196" r:id="rId6" imgW="1038370" imgH="980952" progId="PBrush">
                   <p:embed/>
                 </p:oleObj>
               </mc:Choice>
@@ -21572,22 +21571,26 @@
               <a:defRPr/>
             </a:pPr>
             <a:r>
-              <a:rPr lang="en-US" sz="1600" u="sng" dirty="0" smtClean="0">
+              <a:rPr lang="en-US" sz="1600" u="sng">
                 <a:hlinkClick r:id="rId2"/>
               </a:rPr>
               <a:t>https</a:t>
             </a:r>
             <a:r>
-              <a:rPr lang="en-US" sz="1600" u="sng" dirty="0">
+              <a:rPr lang="en-US" sz="1600" u="sng">
                 <a:hlinkClick r:id="rId2"/>
               </a:rPr>
               <a:t>://</a:t>
             </a:r>
             <a:r>
-              <a:rPr lang="en-US" sz="1600" u="sng" dirty="0" smtClean="0">
+              <a:rPr lang="en-US" sz="1600" u="sng" smtClean="0">
                 <a:hlinkClick r:id="rId2"/>
               </a:rPr>
-              <a:t>www.dropbox.com/sh/rn714n1ugt6t3ke/AAB2rCt7FCHstSCp_NbnLekya?dl=0</a:t>
+              <a:t>www.dropbox.com/sh/ch77tiusjbpq6k5/AADk39iJzfaIBNbYVWPLSS-va?dl=0</a:t>
+            </a:r>
+            <a:r>
+              <a:rPr lang="en-US" sz="1600" u="sng" smtClean="0"/>
+              <a:t> </a:t>
             </a:r>
             <a:r>
               <a:rPr lang="en-US" sz="1600" u="sng" dirty="0" smtClean="0"/>
@@ -22353,11 +22356,7 @@
             </a:r>
             <a:r>
               <a:rPr lang="de-DE" altLang="de-DE" dirty="0" smtClean="0"/>
-              <a:t> C</a:t>
-            </a:r>
-            <a:r>
-              <a:rPr lang="de-DE" altLang="de-DE" dirty="0" smtClean="0"/>
-              <a:t>++ </a:t>
+              <a:t> C++ </a:t>
             </a:r>
             <a:br>
               <a:rPr lang="de-DE" altLang="de-DE" dirty="0" smtClean="0"/>

</xml_diff>